<commit_message>
Adding in model slides
</commit_message>
<xml_diff>
--- a/slides/2.Models.pptx
+++ b/slides/2.Models.pptx
@@ -11,12 +11,12 @@
     <p:sldId id="256" r:id="rId2"/>
     <p:sldId id="292" r:id="rId3"/>
     <p:sldId id="258" r:id="rId4"/>
-    <p:sldId id="259" r:id="rId5"/>
-    <p:sldId id="293" r:id="rId6"/>
-    <p:sldId id="308" r:id="rId7"/>
-    <p:sldId id="307" r:id="rId8"/>
-    <p:sldId id="316" r:id="rId9"/>
-    <p:sldId id="294" r:id="rId10"/>
+    <p:sldId id="294" r:id="rId5"/>
+    <p:sldId id="259" r:id="rId6"/>
+    <p:sldId id="293" r:id="rId7"/>
+    <p:sldId id="308" r:id="rId8"/>
+    <p:sldId id="307" r:id="rId9"/>
+    <p:sldId id="316" r:id="rId10"/>
     <p:sldId id="295" r:id="rId11"/>
     <p:sldId id="296" r:id="rId12"/>
     <p:sldId id="297" r:id="rId13"/>
@@ -556,7 +556,7 @@
           <a:p>
             <a:fld id="{DB8CED03-68E4-184F-96C6-86FA95DC3A06}" type="slidenum">
               <a:rPr lang="en-US" smtClean="0"/>
-              <a:t>7</a:t>
+              <a:t>8</a:t>
             </a:fld>
             <a:endParaRPr lang="en-US"/>
           </a:p>
@@ -4951,6 +4951,141 @@
           <p:cNvPr id="2" name="Title 1">
             <a:extLst>
               <a:ext uri="{FF2B5EF4-FFF2-40B4-BE49-F238E27FC236}">
+                <a16:creationId xmlns:a16="http://schemas.microsoft.com/office/drawing/2014/main" id="{FAD24512-80B2-B900-EEFB-6DA1FDBD6E4C}"/>
+              </a:ext>
+            </a:extLst>
+          </p:cNvPr>
+          <p:cNvSpPr>
+            <a:spLocks noGrp="1"/>
+          </p:cNvSpPr>
+          <p:nvPr>
+            <p:ph type="title"/>
+          </p:nvPr>
+        </p:nvSpPr>
+        <p:spPr/>
+        <p:txBody>
+          <a:bodyPr/>
+          <a:lstStyle/>
+          <a:p>
+            <a:r>
+              <a:rPr lang="en-US" dirty="0"/>
+              <a:t>What meta-analysis is doing…</a:t>
+            </a:r>
+          </a:p>
+        </p:txBody>
+      </p:sp>
+      <p:pic>
+        <p:nvPicPr>
+          <p:cNvPr id="5" name="Content Placeholder 4" descr="Diagram, schematic&#10;&#10;Description automatically generated">
+            <a:extLst>
+              <a:ext uri="{FF2B5EF4-FFF2-40B4-BE49-F238E27FC236}">
+                <a16:creationId xmlns:a16="http://schemas.microsoft.com/office/drawing/2014/main" id="{2AC7F462-59BE-FAA1-A617-2E1E75780DE0}"/>
+              </a:ext>
+            </a:extLst>
+          </p:cNvPr>
+          <p:cNvPicPr>
+            <a:picLocks noGrp="1" noChangeAspect="1"/>
+          </p:cNvPicPr>
+          <p:nvPr>
+            <p:ph idx="1"/>
+          </p:nvPr>
+        </p:nvPicPr>
+        <p:blipFill>
+          <a:blip r:embed="rId2"/>
+          <a:stretch>
+            <a:fillRect/>
+          </a:stretch>
+        </p:blipFill>
+        <p:spPr>
+          <a:xfrm>
+            <a:off x="349562" y="1322946"/>
+            <a:ext cx="5939562" cy="5165722"/>
+          </a:xfrm>
+        </p:spPr>
+      </p:pic>
+      <p:sp>
+        <p:nvSpPr>
+          <p:cNvPr id="6" name="TextBox 5">
+            <a:extLst>
+              <a:ext uri="{FF2B5EF4-FFF2-40B4-BE49-F238E27FC236}">
+                <a16:creationId xmlns:a16="http://schemas.microsoft.com/office/drawing/2014/main" id="{512A4C0D-1988-589E-B692-A971E22CAA7E}"/>
+              </a:ext>
+            </a:extLst>
+          </p:cNvPr>
+          <p:cNvSpPr txBox="1"/>
+          <p:nvPr/>
+        </p:nvSpPr>
+        <p:spPr>
+          <a:xfrm>
+            <a:off x="457200" y="6488668"/>
+            <a:ext cx="4114800" cy="369332"/>
+          </a:xfrm>
+          <a:prstGeom prst="rect">
+            <a:avLst/>
+          </a:prstGeom>
+          <a:noFill/>
+        </p:spPr>
+        <p:txBody>
+          <a:bodyPr wrap="square" rtlCol="0">
+            <a:spAutoFit/>
+          </a:bodyPr>
+          <a:lstStyle/>
+          <a:p>
+            <a:r>
+              <a:rPr lang="en-US" dirty="0"/>
+              <a:t>Hillebrand &amp; </a:t>
+            </a:r>
+            <a:r>
+              <a:rPr lang="en-US" dirty="0" err="1"/>
+              <a:t>Gurevitch</a:t>
+            </a:r>
+            <a:r>
+              <a:rPr lang="en-US" dirty="0"/>
+              <a:t> (2016). </a:t>
+            </a:r>
+            <a:r>
+              <a:rPr lang="en-US" dirty="0" err="1"/>
+              <a:t>eLS</a:t>
+            </a:r>
+            <a:endParaRPr lang="en-US" dirty="0"/>
+          </a:p>
+        </p:txBody>
+      </p:sp>
+    </p:spTree>
+    <p:extLst>
+      <p:ext uri="{BB962C8B-B14F-4D97-AF65-F5344CB8AC3E}">
+        <p14:creationId xmlns:p14="http://schemas.microsoft.com/office/powerpoint/2010/main" val="4005888287"/>
+      </p:ext>
+    </p:extLst>
+  </p:cSld>
+  <p:clrMapOvr>
+    <a:masterClrMapping/>
+  </p:clrMapOvr>
+</p:sld>
+</file>
+
+<file path=ppt/slides/slide5.xml><?xml version="1.0" encoding="utf-8"?>
+<p:sld xmlns:a="http://schemas.openxmlformats.org/drawingml/2006/main" xmlns:r="http://schemas.openxmlformats.org/officeDocument/2006/relationships" xmlns:p="http://schemas.openxmlformats.org/presentationml/2006/main">
+  <p:cSld>
+    <p:spTree>
+      <p:nvGrpSpPr>
+        <p:cNvPr id="1" name=""/>
+        <p:cNvGrpSpPr/>
+        <p:nvPr/>
+      </p:nvGrpSpPr>
+      <p:grpSpPr>
+        <a:xfrm>
+          <a:off x="0" y="0"/>
+          <a:ext cx="0" cy="0"/>
+          <a:chOff x="0" y="0"/>
+          <a:chExt cx="0" cy="0"/>
+        </a:xfrm>
+      </p:grpSpPr>
+      <p:sp>
+        <p:nvSpPr>
+          <p:cNvPr id="2" name="Title 1">
+            <a:extLst>
+              <a:ext uri="{FF2B5EF4-FFF2-40B4-BE49-F238E27FC236}">
                 <a16:creationId xmlns:a16="http://schemas.microsoft.com/office/drawing/2014/main" id="{72078BF5-73C4-A14D-A015-84760165405D}"/>
               </a:ext>
             </a:extLst>
@@ -5326,7 +5461,7 @@
 </p:sld>
 </file>
 
-<file path=ppt/slides/slide5.xml><?xml version="1.0" encoding="utf-8"?>
+<file path=ppt/slides/slide6.xml><?xml version="1.0" encoding="utf-8"?>
 <p:sld xmlns:a="http://schemas.openxmlformats.org/drawingml/2006/main" xmlns:r="http://schemas.openxmlformats.org/officeDocument/2006/relationships" xmlns:p="http://schemas.openxmlformats.org/presentationml/2006/main">
   <p:cSld>
     <p:spTree>
@@ -5839,6 +5974,36 @@
           </a:p>
         </p:txBody>
       </p:sp>
+      <p:pic>
+        <p:nvPicPr>
+          <p:cNvPr id="12" name="Picture 11" descr="A picture containing text&#10;&#10;Description automatically generated">
+            <a:extLst>
+              <a:ext uri="{FF2B5EF4-FFF2-40B4-BE49-F238E27FC236}">
+                <a16:creationId xmlns:a16="http://schemas.microsoft.com/office/drawing/2014/main" id="{DF4F8CDB-E8E5-D0CD-63D3-8676D65222B9}"/>
+              </a:ext>
+            </a:extLst>
+          </p:cNvPr>
+          <p:cNvPicPr>
+            <a:picLocks noChangeAspect="1"/>
+          </p:cNvPicPr>
+          <p:nvPr/>
+        </p:nvPicPr>
+        <p:blipFill>
+          <a:blip r:embed="rId3"/>
+          <a:stretch>
+            <a:fillRect/>
+          </a:stretch>
+        </p:blipFill>
+        <p:spPr>
+          <a:xfrm>
+            <a:off x="152399" y="4711079"/>
+            <a:ext cx="4630003" cy="1624022"/>
+          </a:xfrm>
+          <a:prstGeom prst="rect">
+            <a:avLst/>
+          </a:prstGeom>
+        </p:spPr>
+      </p:pic>
     </p:spTree>
     <p:extLst>
       <p:ext uri="{BB962C8B-B14F-4D97-AF65-F5344CB8AC3E}">
@@ -5983,7 +6148,7 @@
 </p:sld>
 </file>
 
-<file path=ppt/slides/slide6.xml><?xml version="1.0" encoding="utf-8"?>
+<file path=ppt/slides/slide7.xml><?xml version="1.0" encoding="utf-8"?>
 <p:sld xmlns:a="http://schemas.openxmlformats.org/drawingml/2006/main" xmlns:r="http://schemas.openxmlformats.org/officeDocument/2006/relationships" xmlns:p="http://schemas.openxmlformats.org/presentationml/2006/main">
   <p:cSld>
     <p:spTree>
@@ -6595,7 +6760,7 @@
 </p:sld>
 </file>
 
-<file path=ppt/slides/slide7.xml><?xml version="1.0" encoding="utf-8"?>
+<file path=ppt/slides/slide8.xml><?xml version="1.0" encoding="utf-8"?>
 <p:sld xmlns:a="http://schemas.openxmlformats.org/drawingml/2006/main" xmlns:r="http://schemas.openxmlformats.org/officeDocument/2006/relationships" xmlns:p="http://schemas.openxmlformats.org/presentationml/2006/main">
   <p:cSld>
     <p:spTree>
@@ -8670,7 +8835,7 @@
 </p:sld>
 </file>
 
-<file path=ppt/slides/slide8.xml><?xml version="1.0" encoding="utf-8"?>
+<file path=ppt/slides/slide9.xml><?xml version="1.0" encoding="utf-8"?>
 <p:sld xmlns:a="http://schemas.openxmlformats.org/drawingml/2006/main" xmlns:r="http://schemas.openxmlformats.org/officeDocument/2006/relationships" xmlns:p="http://schemas.openxmlformats.org/presentationml/2006/main">
   <p:cSld>
     <p:spTree>
@@ -8882,86 +9047,6 @@
     <p:extLst>
       <p:ext uri="{BB962C8B-B14F-4D97-AF65-F5344CB8AC3E}">
         <p14:creationId xmlns:p14="http://schemas.microsoft.com/office/powerpoint/2010/main" val="799570753"/>
-      </p:ext>
-    </p:extLst>
-  </p:cSld>
-  <p:clrMapOvr>
-    <a:masterClrMapping/>
-  </p:clrMapOvr>
-</p:sld>
-</file>
-
-<file path=ppt/slides/slide9.xml><?xml version="1.0" encoding="utf-8"?>
-<p:sld xmlns:a="http://schemas.openxmlformats.org/drawingml/2006/main" xmlns:r="http://schemas.openxmlformats.org/officeDocument/2006/relationships" xmlns:p="http://schemas.openxmlformats.org/presentationml/2006/main">
-  <p:cSld>
-    <p:spTree>
-      <p:nvGrpSpPr>
-        <p:cNvPr id="1" name=""/>
-        <p:cNvGrpSpPr/>
-        <p:nvPr/>
-      </p:nvGrpSpPr>
-      <p:grpSpPr>
-        <a:xfrm>
-          <a:off x="0" y="0"/>
-          <a:ext cx="0" cy="0"/>
-          <a:chOff x="0" y="0"/>
-          <a:chExt cx="0" cy="0"/>
-        </a:xfrm>
-      </p:grpSpPr>
-      <p:sp>
-        <p:nvSpPr>
-          <p:cNvPr id="2" name="Title 1">
-            <a:extLst>
-              <a:ext uri="{FF2B5EF4-FFF2-40B4-BE49-F238E27FC236}">
-                <a16:creationId xmlns:a16="http://schemas.microsoft.com/office/drawing/2014/main" id="{FAD24512-80B2-B900-EEFB-6DA1FDBD6E4C}"/>
-              </a:ext>
-            </a:extLst>
-          </p:cNvPr>
-          <p:cNvSpPr>
-            <a:spLocks noGrp="1"/>
-          </p:cNvSpPr>
-          <p:nvPr>
-            <p:ph type="title"/>
-          </p:nvPr>
-        </p:nvSpPr>
-        <p:spPr/>
-        <p:txBody>
-          <a:bodyPr/>
-          <a:lstStyle/>
-          <a:p>
-            <a:endParaRPr lang="en-US"/>
-          </a:p>
-        </p:txBody>
-      </p:sp>
-      <p:sp>
-        <p:nvSpPr>
-          <p:cNvPr id="3" name="Content Placeholder 2">
-            <a:extLst>
-              <a:ext uri="{FF2B5EF4-FFF2-40B4-BE49-F238E27FC236}">
-                <a16:creationId xmlns:a16="http://schemas.microsoft.com/office/drawing/2014/main" id="{C523E400-7819-3761-12DD-799D9CB7C520}"/>
-              </a:ext>
-            </a:extLst>
-          </p:cNvPr>
-          <p:cNvSpPr>
-            <a:spLocks noGrp="1"/>
-          </p:cNvSpPr>
-          <p:nvPr>
-            <p:ph idx="1"/>
-          </p:nvPr>
-        </p:nvSpPr>
-        <p:spPr/>
-        <p:txBody>
-          <a:bodyPr/>
-          <a:lstStyle/>
-          <a:p>
-            <a:endParaRPr lang="en-US"/>
-          </a:p>
-        </p:txBody>
-      </p:sp>
-    </p:spTree>
-    <p:extLst>
-      <p:ext uri="{BB962C8B-B14F-4D97-AF65-F5344CB8AC3E}">
-        <p14:creationId xmlns:p14="http://schemas.microsoft.com/office/powerpoint/2010/main" val="4005888287"/>
       </p:ext>
     </p:extLst>
   </p:cSld>

</xml_diff>

<commit_message>
Added SEB logos etc
</commit_message>
<xml_diff>
--- a/slides/2.Models.pptx
+++ b/slides/2.Models.pptx
@@ -220,7 +220,7 @@
           <a:p>
             <a:fld id="{1832866B-A228-A54E-B5D8-00FBC732E1AE}" type="datetimeFigureOut">
               <a:rPr lang="en-US" smtClean="0"/>
-              <a:t>6/14/22</a:t>
+              <a:t>6/15/22</a:t>
             </a:fld>
             <a:endParaRPr lang="en-US"/>
           </a:p>
@@ -754,7 +754,7 @@
           <a:p>
             <a:fld id="{241EB5C9-1307-BA42-ABA2-0BC069CD8E7F}" type="datetimeFigureOut">
               <a:rPr lang="en-US" smtClean="0"/>
-              <a:t>6/14/22</a:t>
+              <a:t>6/15/22</a:t>
             </a:fld>
             <a:endParaRPr lang="en-US"/>
           </a:p>
@@ -922,7 +922,7 @@
           <a:p>
             <a:fld id="{241EB5C9-1307-BA42-ABA2-0BC069CD8E7F}" type="datetimeFigureOut">
               <a:rPr lang="en-US" smtClean="0"/>
-              <a:t>6/14/22</a:t>
+              <a:t>6/15/22</a:t>
             </a:fld>
             <a:endParaRPr lang="en-US"/>
           </a:p>
@@ -1100,7 +1100,7 @@
           <a:p>
             <a:fld id="{241EB5C9-1307-BA42-ABA2-0BC069CD8E7F}" type="datetimeFigureOut">
               <a:rPr lang="en-US" smtClean="0"/>
-              <a:t>6/14/22</a:t>
+              <a:t>6/15/22</a:t>
             </a:fld>
             <a:endParaRPr lang="en-US"/>
           </a:p>
@@ -1268,7 +1268,7 @@
           <a:p>
             <a:fld id="{241EB5C9-1307-BA42-ABA2-0BC069CD8E7F}" type="datetimeFigureOut">
               <a:rPr lang="en-US" smtClean="0"/>
-              <a:t>6/14/22</a:t>
+              <a:t>6/15/22</a:t>
             </a:fld>
             <a:endParaRPr lang="en-US"/>
           </a:p>
@@ -1513,7 +1513,7 @@
           <a:p>
             <a:fld id="{241EB5C9-1307-BA42-ABA2-0BC069CD8E7F}" type="datetimeFigureOut">
               <a:rPr lang="en-US" smtClean="0"/>
-              <a:t>6/14/22</a:t>
+              <a:t>6/15/22</a:t>
             </a:fld>
             <a:endParaRPr lang="en-US"/>
           </a:p>
@@ -1798,7 +1798,7 @@
           <a:p>
             <a:fld id="{241EB5C9-1307-BA42-ABA2-0BC069CD8E7F}" type="datetimeFigureOut">
               <a:rPr lang="en-US" smtClean="0"/>
-              <a:t>6/14/22</a:t>
+              <a:t>6/15/22</a:t>
             </a:fld>
             <a:endParaRPr lang="en-US"/>
           </a:p>
@@ -2217,7 +2217,7 @@
           <a:p>
             <a:fld id="{241EB5C9-1307-BA42-ABA2-0BC069CD8E7F}" type="datetimeFigureOut">
               <a:rPr lang="en-US" smtClean="0"/>
-              <a:t>6/14/22</a:t>
+              <a:t>6/15/22</a:t>
             </a:fld>
             <a:endParaRPr lang="en-US"/>
           </a:p>
@@ -2334,7 +2334,7 @@
           <a:p>
             <a:fld id="{241EB5C9-1307-BA42-ABA2-0BC069CD8E7F}" type="datetimeFigureOut">
               <a:rPr lang="en-US" smtClean="0"/>
-              <a:t>6/14/22</a:t>
+              <a:t>6/15/22</a:t>
             </a:fld>
             <a:endParaRPr lang="en-US"/>
           </a:p>
@@ -2429,7 +2429,7 @@
           <a:p>
             <a:fld id="{241EB5C9-1307-BA42-ABA2-0BC069CD8E7F}" type="datetimeFigureOut">
               <a:rPr lang="en-US" smtClean="0"/>
-              <a:t>6/14/22</a:t>
+              <a:t>6/15/22</a:t>
             </a:fld>
             <a:endParaRPr lang="en-US"/>
           </a:p>
@@ -2704,7 +2704,7 @@
           <a:p>
             <a:fld id="{241EB5C9-1307-BA42-ABA2-0BC069CD8E7F}" type="datetimeFigureOut">
               <a:rPr lang="en-US" smtClean="0"/>
-              <a:t>6/14/22</a:t>
+              <a:t>6/15/22</a:t>
             </a:fld>
             <a:endParaRPr lang="en-US"/>
           </a:p>
@@ -2956,7 +2956,7 @@
           <a:p>
             <a:fld id="{241EB5C9-1307-BA42-ABA2-0BC069CD8E7F}" type="datetimeFigureOut">
               <a:rPr lang="en-US" smtClean="0"/>
-              <a:t>6/14/22</a:t>
+              <a:t>6/15/22</a:t>
             </a:fld>
             <a:endParaRPr lang="en-US"/>
           </a:p>
@@ -3167,7 +3167,7 @@
           <a:p>
             <a:fld id="{241EB5C9-1307-BA42-ABA2-0BC069CD8E7F}" type="datetimeFigureOut">
               <a:rPr lang="en-US" smtClean="0"/>
-              <a:t>6/14/22</a:t>
+              <a:t>6/15/22</a:t>
             </a:fld>
             <a:endParaRPr lang="en-US"/>
           </a:p>
@@ -3554,7 +3554,7 @@
         </p:nvSpPr>
         <p:spPr>
           <a:xfrm>
-            <a:off x="-18867" y="5794317"/>
+            <a:off x="-15499" y="5312680"/>
             <a:ext cx="9174996" cy="794423"/>
           </a:xfrm>
         </p:spPr>
@@ -3620,7 +3620,7 @@
         </p:blipFill>
         <p:spPr>
           <a:xfrm>
-            <a:off x="5251979" y="2573565"/>
+            <a:off x="5083444" y="2313252"/>
             <a:ext cx="3252251" cy="2473609"/>
           </a:xfrm>
           <a:prstGeom prst="rect">
@@ -3642,7 +3642,7 @@
         </p:nvSpPr>
         <p:spPr>
           <a:xfrm>
-            <a:off x="6031187" y="5158353"/>
+            <a:off x="5862652" y="4898040"/>
             <a:ext cx="1911459" cy="338554"/>
           </a:xfrm>
           <a:prstGeom prst="rect">
@@ -3699,7 +3699,7 @@
         </p:blipFill>
         <p:spPr>
           <a:xfrm>
-            <a:off x="587611" y="2431432"/>
+            <a:off x="419076" y="2171119"/>
             <a:ext cx="4286597" cy="2597396"/>
           </a:xfrm>
           <a:prstGeom prst="rect">
@@ -3721,7 +3721,7 @@
         </p:nvSpPr>
         <p:spPr>
           <a:xfrm>
-            <a:off x="2024690" y="5158353"/>
+            <a:off x="1856155" y="4898040"/>
             <a:ext cx="2658820" cy="338554"/>
           </a:xfrm>
           <a:prstGeom prst="rect">
@@ -3858,6 +3858,187 @@
           </a:p>
         </p:txBody>
       </p:sp>
+      <p:grpSp>
+        <p:nvGrpSpPr>
+          <p:cNvPr id="13" name="Group 12">
+            <a:extLst>
+              <a:ext uri="{FF2B5EF4-FFF2-40B4-BE49-F238E27FC236}">
+                <a16:creationId xmlns:a16="http://schemas.microsoft.com/office/drawing/2014/main" id="{C9560C5D-6344-508E-9D9C-E454CD78E396}"/>
+              </a:ext>
+            </a:extLst>
+          </p:cNvPr>
+          <p:cNvGrpSpPr/>
+          <p:nvPr/>
+        </p:nvGrpSpPr>
+        <p:grpSpPr>
+          <a:xfrm>
+            <a:off x="276831" y="6292960"/>
+            <a:ext cx="2445189" cy="400110"/>
+            <a:chOff x="540022" y="6074125"/>
+            <a:chExt cx="2445189" cy="400110"/>
+          </a:xfrm>
+        </p:grpSpPr>
+        <p:sp>
+          <p:nvSpPr>
+            <p:cNvPr id="14" name="TextBox 13">
+              <a:extLst>
+                <a:ext uri="{FF2B5EF4-FFF2-40B4-BE49-F238E27FC236}">
+                  <a16:creationId xmlns:a16="http://schemas.microsoft.com/office/drawing/2014/main" id="{B8EDCD62-5C56-4026-3D8D-911E2D2FCC11}"/>
+                </a:ext>
+              </a:extLst>
+            </p:cNvPr>
+            <p:cNvSpPr txBox="1"/>
+            <p:nvPr/>
+          </p:nvSpPr>
+          <p:spPr>
+            <a:xfrm>
+              <a:off x="838046" y="6074125"/>
+              <a:ext cx="2147165" cy="400110"/>
+            </a:xfrm>
+            <a:prstGeom prst="rect">
+              <a:avLst/>
+            </a:prstGeom>
+            <a:noFill/>
+          </p:spPr>
+          <p:txBody>
+            <a:bodyPr wrap="square">
+              <a:spAutoFit/>
+            </a:bodyPr>
+            <a:lstStyle/>
+            <a:p>
+              <a:r>
+                <a:rPr lang="en-AU" sz="2000" dirty="0">
+                  <a:solidFill>
+                    <a:schemeClr val="tx1">
+                      <a:lumMod val="85000"/>
+                      <a:lumOff val="15000"/>
+                    </a:schemeClr>
+                  </a:solidFill>
+                </a:rPr>
+                <a:t>#SEBmeta</a:t>
+              </a:r>
+            </a:p>
+          </p:txBody>
+        </p:sp>
+        <p:pic>
+          <p:nvPicPr>
+            <p:cNvPr id="15" name="Graphic 14">
+              <a:extLst>
+                <a:ext uri="{FF2B5EF4-FFF2-40B4-BE49-F238E27FC236}">
+                  <a16:creationId xmlns:a16="http://schemas.microsoft.com/office/drawing/2014/main" id="{D758EFAF-A90C-C24C-0AF4-A94F490E5F70}"/>
+                </a:ext>
+              </a:extLst>
+            </p:cNvPr>
+            <p:cNvPicPr>
+              <a:picLocks noChangeAspect="1"/>
+            </p:cNvPicPr>
+            <p:nvPr/>
+          </p:nvPicPr>
+          <p:blipFill>
+            <a:blip r:embed="rId6">
+              <a:extLst>
+                <a:ext uri="{96DAC541-7B7A-43D3-8B79-37D633B846F1}">
+                  <asvg:svgBlip xmlns:asvg="http://schemas.microsoft.com/office/drawing/2016/SVG/main" r:embed="rId7"/>
+                </a:ext>
+              </a:extLst>
+            </a:blip>
+            <a:stretch>
+              <a:fillRect/>
+            </a:stretch>
+          </p:blipFill>
+          <p:spPr>
+            <a:xfrm>
+              <a:off x="540022" y="6150211"/>
+              <a:ext cx="354923" cy="287674"/>
+            </a:xfrm>
+            <a:prstGeom prst="rect">
+              <a:avLst/>
+            </a:prstGeom>
+          </p:spPr>
+        </p:pic>
+      </p:grpSp>
+      <p:pic>
+        <p:nvPicPr>
+          <p:cNvPr id="16" name="Picture 15" descr="Logo, company name&#10;&#10;Description automatically generated">
+            <a:extLst>
+              <a:ext uri="{FF2B5EF4-FFF2-40B4-BE49-F238E27FC236}">
+                <a16:creationId xmlns:a16="http://schemas.microsoft.com/office/drawing/2014/main" id="{35AD8716-A758-84D4-94B4-9F0716B33FB1}"/>
+              </a:ext>
+            </a:extLst>
+          </p:cNvPr>
+          <p:cNvPicPr>
+            <a:picLocks noChangeAspect="1"/>
+          </p:cNvPicPr>
+          <p:nvPr/>
+        </p:nvPicPr>
+        <p:blipFill>
+          <a:blip r:embed="rId8">
+            <a:clrChange>
+              <a:clrFrom>
+                <a:srgbClr val="FFFFFF"/>
+              </a:clrFrom>
+              <a:clrTo>
+                <a:srgbClr val="FFFFFF">
+                  <a:alpha val="0"/>
+                </a:srgbClr>
+              </a:clrTo>
+            </a:clrChange>
+          </a:blip>
+          <a:stretch>
+            <a:fillRect/>
+          </a:stretch>
+        </p:blipFill>
+        <p:spPr>
+          <a:xfrm>
+            <a:off x="6132293" y="5985646"/>
+            <a:ext cx="1376147" cy="794424"/>
+          </a:xfrm>
+          <a:prstGeom prst="rect">
+            <a:avLst/>
+          </a:prstGeom>
+        </p:spPr>
+      </p:pic>
+      <p:pic>
+        <p:nvPicPr>
+          <p:cNvPr id="17" name="Picture 16" descr="A picture containing text, clock, clipart&#10;&#10;Description automatically generated">
+            <a:extLst>
+              <a:ext uri="{FF2B5EF4-FFF2-40B4-BE49-F238E27FC236}">
+                <a16:creationId xmlns:a16="http://schemas.microsoft.com/office/drawing/2014/main" id="{C49CE773-F90E-2CAE-AAD5-E179C6895DED}"/>
+              </a:ext>
+            </a:extLst>
+          </p:cNvPr>
+          <p:cNvPicPr>
+            <a:picLocks noChangeAspect="1"/>
+          </p:cNvPicPr>
+          <p:nvPr/>
+        </p:nvPicPr>
+        <p:blipFill>
+          <a:blip r:embed="rId9">
+            <a:clrChange>
+              <a:clrFrom>
+                <a:srgbClr val="FFFFFF"/>
+              </a:clrFrom>
+              <a:clrTo>
+                <a:srgbClr val="FFFFFF">
+                  <a:alpha val="0"/>
+                </a:srgbClr>
+              </a:clrTo>
+            </a:clrChange>
+          </a:blip>
+          <a:stretch>
+            <a:fillRect/>
+          </a:stretch>
+        </p:blipFill>
+        <p:spPr>
+          <a:xfrm>
+            <a:off x="7691664" y="6330338"/>
+            <a:ext cx="1259980" cy="403066"/>
+          </a:xfrm>
+          <a:prstGeom prst="rect">
+            <a:avLst/>
+          </a:prstGeom>
+        </p:spPr>
+      </p:pic>
     </p:spTree>
   </p:cSld>
   <p:clrMapOvr>

</xml_diff>

<commit_message>
Adding in Uni logos. They need to know where we are all from! A little advertising is important
</commit_message>
<xml_diff>
--- a/slides/2.Models.pptx
+++ b/slides/2.Models.pptx
@@ -8,7 +8,7 @@
     <p:notesMasterId r:id="rId15"/>
   </p:notesMasterIdLst>
   <p:sldIdLst>
-    <p:sldId id="256" r:id="rId2"/>
+    <p:sldId id="317" r:id="rId2"/>
     <p:sldId id="292" r:id="rId3"/>
     <p:sldId id="258" r:id="rId4"/>
     <p:sldId id="294" r:id="rId5"/>
@@ -220,7 +220,7 @@
           <a:p>
             <a:fld id="{1832866B-A228-A54E-B5D8-00FBC732E1AE}" type="datetimeFigureOut">
               <a:rPr lang="en-US" smtClean="0"/>
-              <a:t>6/15/22</a:t>
+              <a:t>6/17/22</a:t>
             </a:fld>
             <a:endParaRPr lang="en-US"/>
           </a:p>
@@ -754,7 +754,7 @@
           <a:p>
             <a:fld id="{241EB5C9-1307-BA42-ABA2-0BC069CD8E7F}" type="datetimeFigureOut">
               <a:rPr lang="en-US" smtClean="0"/>
-              <a:t>6/15/22</a:t>
+              <a:t>6/17/22</a:t>
             </a:fld>
             <a:endParaRPr lang="en-US"/>
           </a:p>
@@ -922,7 +922,7 @@
           <a:p>
             <a:fld id="{241EB5C9-1307-BA42-ABA2-0BC069CD8E7F}" type="datetimeFigureOut">
               <a:rPr lang="en-US" smtClean="0"/>
-              <a:t>6/15/22</a:t>
+              <a:t>6/17/22</a:t>
             </a:fld>
             <a:endParaRPr lang="en-US"/>
           </a:p>
@@ -1100,7 +1100,7 @@
           <a:p>
             <a:fld id="{241EB5C9-1307-BA42-ABA2-0BC069CD8E7F}" type="datetimeFigureOut">
               <a:rPr lang="en-US" smtClean="0"/>
-              <a:t>6/15/22</a:t>
+              <a:t>6/17/22</a:t>
             </a:fld>
             <a:endParaRPr lang="en-US"/>
           </a:p>
@@ -1268,7 +1268,7 @@
           <a:p>
             <a:fld id="{241EB5C9-1307-BA42-ABA2-0BC069CD8E7F}" type="datetimeFigureOut">
               <a:rPr lang="en-US" smtClean="0"/>
-              <a:t>6/15/22</a:t>
+              <a:t>6/17/22</a:t>
             </a:fld>
             <a:endParaRPr lang="en-US"/>
           </a:p>
@@ -1513,7 +1513,7 @@
           <a:p>
             <a:fld id="{241EB5C9-1307-BA42-ABA2-0BC069CD8E7F}" type="datetimeFigureOut">
               <a:rPr lang="en-US" smtClean="0"/>
-              <a:t>6/15/22</a:t>
+              <a:t>6/17/22</a:t>
             </a:fld>
             <a:endParaRPr lang="en-US"/>
           </a:p>
@@ -1798,7 +1798,7 @@
           <a:p>
             <a:fld id="{241EB5C9-1307-BA42-ABA2-0BC069CD8E7F}" type="datetimeFigureOut">
               <a:rPr lang="en-US" smtClean="0"/>
-              <a:t>6/15/22</a:t>
+              <a:t>6/17/22</a:t>
             </a:fld>
             <a:endParaRPr lang="en-US"/>
           </a:p>
@@ -2217,7 +2217,7 @@
           <a:p>
             <a:fld id="{241EB5C9-1307-BA42-ABA2-0BC069CD8E7F}" type="datetimeFigureOut">
               <a:rPr lang="en-US" smtClean="0"/>
-              <a:t>6/15/22</a:t>
+              <a:t>6/17/22</a:t>
             </a:fld>
             <a:endParaRPr lang="en-US"/>
           </a:p>
@@ -2334,7 +2334,7 @@
           <a:p>
             <a:fld id="{241EB5C9-1307-BA42-ABA2-0BC069CD8E7F}" type="datetimeFigureOut">
               <a:rPr lang="en-US" smtClean="0"/>
-              <a:t>6/15/22</a:t>
+              <a:t>6/17/22</a:t>
             </a:fld>
             <a:endParaRPr lang="en-US"/>
           </a:p>
@@ -2429,7 +2429,7 @@
           <a:p>
             <a:fld id="{241EB5C9-1307-BA42-ABA2-0BC069CD8E7F}" type="datetimeFigureOut">
               <a:rPr lang="en-US" smtClean="0"/>
-              <a:t>6/15/22</a:t>
+              <a:t>6/17/22</a:t>
             </a:fld>
             <a:endParaRPr lang="en-US"/>
           </a:p>
@@ -2704,7 +2704,7 @@
           <a:p>
             <a:fld id="{241EB5C9-1307-BA42-ABA2-0BC069CD8E7F}" type="datetimeFigureOut">
               <a:rPr lang="en-US" smtClean="0"/>
-              <a:t>6/15/22</a:t>
+              <a:t>6/17/22</a:t>
             </a:fld>
             <a:endParaRPr lang="en-US"/>
           </a:p>
@@ -2956,7 +2956,7 @@
           <a:p>
             <a:fld id="{241EB5C9-1307-BA42-ABA2-0BC069CD8E7F}" type="datetimeFigureOut">
               <a:rPr lang="en-US" smtClean="0"/>
-              <a:t>6/15/22</a:t>
+              <a:t>6/17/22</a:t>
             </a:fld>
             <a:endParaRPr lang="en-US"/>
           </a:p>
@@ -3167,7 +3167,7 @@
           <a:p>
             <a:fld id="{241EB5C9-1307-BA42-ABA2-0BC069CD8E7F}" type="datetimeFigureOut">
               <a:rPr lang="en-US" smtClean="0"/>
-              <a:t>6/15/22</a:t>
+              <a:t>6/17/22</a:t>
             </a:fld>
             <a:endParaRPr lang="en-US"/>
           </a:p>
@@ -3554,7 +3554,7 @@
         </p:nvSpPr>
         <p:spPr>
           <a:xfrm>
-            <a:off x="-15499" y="5312680"/>
+            <a:off x="0" y="4777069"/>
             <a:ext cx="9174996" cy="794423"/>
           </a:xfrm>
         </p:spPr>
@@ -3567,33 +3567,6 @@
             <a:r>
               <a:rPr dirty="0"/>
               <a:t>Daniel Noble, Nicholas Wu, Essie Rodgers, Patrice Pottier</a:t>
-            </a:r>
-          </a:p>
-        </p:txBody>
-      </p:sp>
-      <p:sp>
-        <p:nvSpPr>
-          <p:cNvPr id="4" name="Date Placeholder 3"/>
-          <p:cNvSpPr>
-            <a:spLocks noGrp="1"/>
-          </p:cNvSpPr>
-          <p:nvPr>
-            <p:ph type="dt" sz="half" idx="10"/>
-          </p:nvPr>
-        </p:nvSpPr>
-        <p:spPr>
-          <a:xfrm>
-            <a:off x="4060556" y="6373814"/>
-            <a:ext cx="1022888" cy="365125"/>
-          </a:xfrm>
-        </p:spPr>
-        <p:txBody>
-          <a:bodyPr/>
-          <a:lstStyle/>
-          <a:p>
-            <a:r>
-              <a:rPr dirty="0"/>
-              <a:t>2022-06-06</a:t>
             </a:r>
           </a:p>
         </p:txBody>
@@ -3620,8 +3593,8 @@
         </p:blipFill>
         <p:spPr>
           <a:xfrm>
-            <a:off x="5083444" y="2313252"/>
-            <a:ext cx="3252251" cy="2473609"/>
+            <a:off x="5083444" y="2501717"/>
+            <a:ext cx="2424996" cy="1844412"/>
           </a:xfrm>
           <a:prstGeom prst="rect">
             <a:avLst/>
@@ -3642,7 +3615,7 @@
         </p:nvSpPr>
         <p:spPr>
           <a:xfrm>
-            <a:off x="5862652" y="4898040"/>
+            <a:off x="5862652" y="4346257"/>
             <a:ext cx="1911459" cy="338554"/>
           </a:xfrm>
           <a:prstGeom prst="rect">
@@ -3699,8 +3672,8 @@
         </p:blipFill>
         <p:spPr>
           <a:xfrm>
-            <a:off x="419076" y="2171119"/>
-            <a:ext cx="4286597" cy="2597396"/>
+            <a:off x="1319748" y="2387149"/>
+            <a:ext cx="3252252" cy="1970651"/>
           </a:xfrm>
           <a:prstGeom prst="rect">
             <a:avLst/>
@@ -3721,7 +3694,7 @@
         </p:nvSpPr>
         <p:spPr>
           <a:xfrm>
-            <a:off x="1856155" y="4898040"/>
+            <a:off x="1856155" y="4346257"/>
             <a:ext cx="2658820" cy="338554"/>
           </a:xfrm>
           <a:prstGeom prst="rect">
@@ -3757,113 +3730,12 @@
           </a:p>
         </p:txBody>
       </p:sp>
-      <p:sp>
-        <p:nvSpPr>
-          <p:cNvPr id="12" name="Title 1">
+      <p:grpSp>
+        <p:nvGrpSpPr>
+          <p:cNvPr id="9" name="Group 8">
             <a:extLst>
               <a:ext uri="{FF2B5EF4-FFF2-40B4-BE49-F238E27FC236}">
-                <a16:creationId xmlns:a16="http://schemas.microsoft.com/office/drawing/2014/main" id="{D7948484-FA9A-8ED0-34E2-1EE1A43C6B8D}"/>
-              </a:ext>
-            </a:extLst>
-          </p:cNvPr>
-          <p:cNvSpPr txBox="1">
-            <a:spLocks/>
-          </p:cNvSpPr>
-          <p:nvPr/>
-        </p:nvSpPr>
-        <p:spPr>
-          <a:xfrm>
-            <a:off x="234593" y="269260"/>
-            <a:ext cx="8674813" cy="830056"/>
-          </a:xfrm>
-          <a:prstGeom prst="rect">
-            <a:avLst/>
-          </a:prstGeom>
-        </p:spPr>
-        <p:txBody>
-          <a:bodyPr vert="horz" lIns="91440" tIns="45720" rIns="91440" bIns="45720" rtlCol="0" anchor="ctr">
-            <a:normAutofit fontScale="97500"/>
-          </a:bodyPr>
-          <a:lstStyle>
-            <a:lvl1pPr algn="ctr" defTabSz="457189" rtl="0" eaLnBrk="1" latinLnBrk="0" hangingPunct="1">
-              <a:spcBef>
-                <a:spcPct val="0"/>
-              </a:spcBef>
-              <a:buNone/>
-              <a:defRPr sz="4400" kern="1200">
-                <a:solidFill>
-                  <a:schemeClr val="tx1"/>
-                </a:solidFill>
-                <a:latin typeface="+mj-lt"/>
-                <a:ea typeface="+mj-ea"/>
-                <a:cs typeface="+mj-cs"/>
-              </a:defRPr>
-            </a:lvl1pPr>
-          </a:lstStyle>
-          <a:p>
-            <a:r>
-              <a:rPr lang="en-AU" sz="3600" b="1" dirty="0"/>
-              <a:t>Meta-analysis in Comparative Physiology</a:t>
-            </a:r>
-            <a:endParaRPr lang="en-AU" sz="3200" b="1" dirty="0">
-              <a:solidFill>
-                <a:schemeClr val="bg1">
-                  <a:lumMod val="65000"/>
-                </a:schemeClr>
-              </a:solidFill>
-            </a:endParaRPr>
-          </a:p>
-        </p:txBody>
-      </p:sp>
-      <p:sp>
-        <p:nvSpPr>
-          <p:cNvPr id="10" name="TextBox 9">
-            <a:extLst>
-              <a:ext uri="{FF2B5EF4-FFF2-40B4-BE49-F238E27FC236}">
-                <a16:creationId xmlns:a16="http://schemas.microsoft.com/office/drawing/2014/main" id="{0A4D02F5-911B-FFCC-D357-FA64759C4253}"/>
-              </a:ext>
-            </a:extLst>
-          </p:cNvPr>
-          <p:cNvSpPr txBox="1"/>
-          <p:nvPr/>
-        </p:nvSpPr>
-        <p:spPr>
-          <a:xfrm>
-            <a:off x="887364" y="1179916"/>
-            <a:ext cx="7426037" cy="954107"/>
-          </a:xfrm>
-          <a:prstGeom prst="rect">
-            <a:avLst/>
-          </a:prstGeom>
-          <a:noFill/>
-        </p:spPr>
-        <p:txBody>
-          <a:bodyPr wrap="square" rtlCol="0">
-            <a:spAutoFit/>
-          </a:bodyPr>
-          <a:lstStyle/>
-          <a:p>
-            <a:pPr algn="ctr"/>
-            <a:r>
-              <a:rPr lang="en-AU" sz="2800" b="1" dirty="0">
-                <a:solidFill>
-                  <a:schemeClr val="bg1">
-                    <a:lumMod val="65000"/>
-                  </a:schemeClr>
-                </a:solidFill>
-              </a:rPr>
-              <a:t>PART 2: Introduction to meta-analytic modelling: common challenges and advanced concepts</a:t>
-            </a:r>
-            <a:endParaRPr lang="en-US" sz="2800" dirty="0"/>
-          </a:p>
-        </p:txBody>
-      </p:sp>
-      <p:grpSp>
-        <p:nvGrpSpPr>
-          <p:cNvPr id="13" name="Group 12">
-            <a:extLst>
-              <a:ext uri="{FF2B5EF4-FFF2-40B4-BE49-F238E27FC236}">
-                <a16:creationId xmlns:a16="http://schemas.microsoft.com/office/drawing/2014/main" id="{C9560C5D-6344-508E-9D9C-E454CD78E396}"/>
+                <a16:creationId xmlns:a16="http://schemas.microsoft.com/office/drawing/2014/main" id="{C2616371-10BB-4137-91D5-D89CD72E20A7}"/>
               </a:ext>
             </a:extLst>
           </p:cNvPr>
@@ -3872,18 +3744,18 @@
         </p:nvGrpSpPr>
         <p:grpSpPr>
           <a:xfrm>
-            <a:off x="276831" y="6292960"/>
-            <a:ext cx="2445189" cy="400110"/>
-            <a:chOff x="540022" y="6074125"/>
-            <a:chExt cx="2445189" cy="400110"/>
+            <a:off x="354923" y="313795"/>
+            <a:ext cx="2720640" cy="522996"/>
+            <a:chOff x="540022" y="6114755"/>
+            <a:chExt cx="2502088" cy="400110"/>
           </a:xfrm>
         </p:grpSpPr>
         <p:sp>
           <p:nvSpPr>
-            <p:cNvPr id="14" name="TextBox 13">
+            <p:cNvPr id="10" name="TextBox 9">
               <a:extLst>
                 <a:ext uri="{FF2B5EF4-FFF2-40B4-BE49-F238E27FC236}">
-                  <a16:creationId xmlns:a16="http://schemas.microsoft.com/office/drawing/2014/main" id="{B8EDCD62-5C56-4026-3D8D-911E2D2FCC11}"/>
+                  <a16:creationId xmlns:a16="http://schemas.microsoft.com/office/drawing/2014/main" id="{416EE04C-7539-4458-9206-E23A8D5CACA8}"/>
                 </a:ext>
               </a:extLst>
             </p:cNvPr>
@@ -3892,7 +3764,7 @@
           </p:nvSpPr>
           <p:spPr>
             <a:xfrm>
-              <a:off x="838046" y="6074125"/>
+              <a:off x="894945" y="6114755"/>
               <a:ext cx="2147165" cy="400110"/>
             </a:xfrm>
             <a:prstGeom prst="rect">
@@ -3922,10 +3794,10 @@
         </p:sp>
         <p:pic>
           <p:nvPicPr>
-            <p:cNvPr id="15" name="Graphic 14">
+            <p:cNvPr id="12" name="Graphic 11">
               <a:extLst>
                 <a:ext uri="{FF2B5EF4-FFF2-40B4-BE49-F238E27FC236}">
-                  <a16:creationId xmlns:a16="http://schemas.microsoft.com/office/drawing/2014/main" id="{D758EFAF-A90C-C24C-0AF4-A94F490E5F70}"/>
+                  <a16:creationId xmlns:a16="http://schemas.microsoft.com/office/drawing/2014/main" id="{ABA82549-1A16-4DD0-9CC6-87B87EEB7C8A}"/>
                 </a:ext>
               </a:extLst>
             </p:cNvPr>
@@ -3959,10 +3831,10 @@
       </p:grpSp>
       <p:pic>
         <p:nvPicPr>
-          <p:cNvPr id="16" name="Picture 15" descr="Logo, company name&#10;&#10;Description automatically generated">
+          <p:cNvPr id="13" name="Picture 12" descr="Logo, company name&#10;&#10;Description automatically generated">
             <a:extLst>
               <a:ext uri="{FF2B5EF4-FFF2-40B4-BE49-F238E27FC236}">
-                <a16:creationId xmlns:a16="http://schemas.microsoft.com/office/drawing/2014/main" id="{35AD8716-A758-84D4-94B4-9F0716B33FB1}"/>
+                <a16:creationId xmlns:a16="http://schemas.microsoft.com/office/drawing/2014/main" id="{906216B2-1998-41A8-BDC9-83DFCFECD5CC}"/>
               </a:ext>
             </a:extLst>
           </p:cNvPr>
@@ -3990,7 +3862,7 @@
         </p:blipFill>
         <p:spPr>
           <a:xfrm>
-            <a:off x="6132293" y="5985646"/>
+            <a:off x="6130307" y="16831"/>
             <a:ext cx="1376147" cy="794424"/>
           </a:xfrm>
           <a:prstGeom prst="rect">
@@ -4000,10 +3872,10 @@
       </p:pic>
       <p:pic>
         <p:nvPicPr>
-          <p:cNvPr id="17" name="Picture 16" descr="A picture containing text, clock, clipart&#10;&#10;Description automatically generated">
+          <p:cNvPr id="15" name="Picture 14" descr="A picture containing text, clock, clipart&#10;&#10;Description automatically generated">
             <a:extLst>
               <a:ext uri="{FF2B5EF4-FFF2-40B4-BE49-F238E27FC236}">
-                <a16:creationId xmlns:a16="http://schemas.microsoft.com/office/drawing/2014/main" id="{C49CE773-F90E-2CAE-AAD5-E179C6895DED}"/>
+                <a16:creationId xmlns:a16="http://schemas.microsoft.com/office/drawing/2014/main" id="{1E9A8D3A-CDA3-46E6-B11F-02A708EB1D2B}"/>
               </a:ext>
             </a:extLst>
           </p:cNvPr>
@@ -4031,8 +3903,225 @@
         </p:blipFill>
         <p:spPr>
           <a:xfrm>
-            <a:off x="7691664" y="6330338"/>
+            <a:off x="7769756" y="274303"/>
             <a:ext cx="1259980" cy="403066"/>
+          </a:xfrm>
+          <a:prstGeom prst="rect">
+            <a:avLst/>
+          </a:prstGeom>
+        </p:spPr>
+      </p:pic>
+      <p:sp>
+        <p:nvSpPr>
+          <p:cNvPr id="16" name="Title 1">
+            <a:extLst>
+              <a:ext uri="{FF2B5EF4-FFF2-40B4-BE49-F238E27FC236}">
+                <a16:creationId xmlns:a16="http://schemas.microsoft.com/office/drawing/2014/main" id="{12F26968-84F1-CDA4-6482-F08B9F216028}"/>
+              </a:ext>
+            </a:extLst>
+          </p:cNvPr>
+          <p:cNvSpPr txBox="1">
+            <a:spLocks/>
+          </p:cNvSpPr>
+          <p:nvPr/>
+        </p:nvSpPr>
+        <p:spPr>
+          <a:xfrm>
+            <a:off x="354923" y="840018"/>
+            <a:ext cx="8674813" cy="1717907"/>
+          </a:xfrm>
+          <a:prstGeom prst="rect">
+            <a:avLst/>
+          </a:prstGeom>
+        </p:spPr>
+        <p:txBody>
+          <a:bodyPr vert="horz" lIns="91440" tIns="45720" rIns="91440" bIns="45720" rtlCol="0" anchor="ctr">
+            <a:normAutofit fontScale="97500"/>
+          </a:bodyPr>
+          <a:lstStyle>
+            <a:lvl1pPr algn="ctr" defTabSz="457189" rtl="0" eaLnBrk="1" latinLnBrk="0" hangingPunct="1">
+              <a:spcBef>
+                <a:spcPct val="0"/>
+              </a:spcBef>
+              <a:buNone/>
+              <a:defRPr sz="4400" kern="1200">
+                <a:solidFill>
+                  <a:schemeClr val="tx1"/>
+                </a:solidFill>
+                <a:latin typeface="+mj-lt"/>
+                <a:ea typeface="+mj-ea"/>
+                <a:cs typeface="+mj-cs"/>
+              </a:defRPr>
+            </a:lvl1pPr>
+          </a:lstStyle>
+          <a:p>
+            <a:r>
+              <a:rPr lang="en-AU" sz="3200" b="1" dirty="0"/>
+              <a:t>Meta-analysis in Comparative Physiology</a:t>
+            </a:r>
+            <a:br>
+              <a:rPr lang="en-AU" sz="3200" b="1" dirty="0"/>
+            </a:br>
+            <a:r>
+              <a:rPr lang="en-AU" sz="3200" b="1" dirty="0">
+                <a:solidFill>
+                  <a:schemeClr val="bg1">
+                    <a:lumMod val="65000"/>
+                  </a:schemeClr>
+                </a:solidFill>
+              </a:rPr>
+              <a:t>PART 2: Introduction to meta-analytic modelling: common challenges and advanced concepts</a:t>
+            </a:r>
+            <a:endParaRPr lang="en-US" sz="3200" dirty="0"/>
+          </a:p>
+        </p:txBody>
+      </p:sp>
+      <p:sp>
+        <p:nvSpPr>
+          <p:cNvPr id="2" name="TextBox 1">
+            <a:extLst>
+              <a:ext uri="{FF2B5EF4-FFF2-40B4-BE49-F238E27FC236}">
+                <a16:creationId xmlns:a16="http://schemas.microsoft.com/office/drawing/2014/main" id="{A73F7515-7B9A-43FA-DE18-7941E1A1A6F7}"/>
+              </a:ext>
+            </a:extLst>
+          </p:cNvPr>
+          <p:cNvSpPr txBox="1"/>
+          <p:nvPr/>
+        </p:nvSpPr>
+        <p:spPr>
+          <a:xfrm>
+            <a:off x="-900332" y="1786597"/>
+            <a:ext cx="184731" cy="369332"/>
+          </a:xfrm>
+          <a:prstGeom prst="rect">
+            <a:avLst/>
+          </a:prstGeom>
+          <a:noFill/>
+        </p:spPr>
+        <p:txBody>
+          <a:bodyPr wrap="none" rtlCol="0">
+            <a:spAutoFit/>
+          </a:bodyPr>
+          <a:lstStyle/>
+          <a:p>
+            <a:endParaRPr lang="en-US"/>
+          </a:p>
+        </p:txBody>
+      </p:sp>
+      <p:pic>
+        <p:nvPicPr>
+          <p:cNvPr id="5" name="Picture 4">
+            <a:extLst>
+              <a:ext uri="{FF2B5EF4-FFF2-40B4-BE49-F238E27FC236}">
+                <a16:creationId xmlns:a16="http://schemas.microsoft.com/office/drawing/2014/main" id="{9EC88816-CA75-F23C-1785-73FAFF81BFAC}"/>
+              </a:ext>
+            </a:extLst>
+          </p:cNvPr>
+          <p:cNvPicPr>
+            <a:picLocks noChangeAspect="1"/>
+          </p:cNvPicPr>
+          <p:nvPr/>
+        </p:nvPicPr>
+        <p:blipFill>
+          <a:blip r:embed="rId10"/>
+          <a:stretch>
+            <a:fillRect/>
+          </a:stretch>
+        </p:blipFill>
+        <p:spPr>
+          <a:xfrm>
+            <a:off x="592673" y="5327983"/>
+            <a:ext cx="1454149" cy="1454149"/>
+          </a:xfrm>
+          <a:prstGeom prst="rect">
+            <a:avLst/>
+          </a:prstGeom>
+        </p:spPr>
+      </p:pic>
+      <p:pic>
+        <p:nvPicPr>
+          <p:cNvPr id="14" name="Picture 13">
+            <a:extLst>
+              <a:ext uri="{FF2B5EF4-FFF2-40B4-BE49-F238E27FC236}">
+                <a16:creationId xmlns:a16="http://schemas.microsoft.com/office/drawing/2014/main" id="{A4A68A49-60D2-DC07-E06B-BE71E8F4CE3F}"/>
+              </a:ext>
+            </a:extLst>
+          </p:cNvPr>
+          <p:cNvPicPr>
+            <a:picLocks noChangeAspect="1"/>
+          </p:cNvPicPr>
+          <p:nvPr/>
+        </p:nvPicPr>
+        <p:blipFill>
+          <a:blip r:embed="rId11"/>
+          <a:stretch>
+            <a:fillRect/>
+          </a:stretch>
+        </p:blipFill>
+        <p:spPr>
+          <a:xfrm>
+            <a:off x="2302331" y="5631177"/>
+            <a:ext cx="2067689" cy="886153"/>
+          </a:xfrm>
+          <a:prstGeom prst="rect">
+            <a:avLst/>
+          </a:prstGeom>
+        </p:spPr>
+      </p:pic>
+      <p:pic>
+        <p:nvPicPr>
+          <p:cNvPr id="17" name="Picture 16">
+            <a:extLst>
+              <a:ext uri="{FF2B5EF4-FFF2-40B4-BE49-F238E27FC236}">
+                <a16:creationId xmlns:a16="http://schemas.microsoft.com/office/drawing/2014/main" id="{ED4DF081-39C3-AC25-DDB4-BA78ADCF159C}"/>
+              </a:ext>
+            </a:extLst>
+          </p:cNvPr>
+          <p:cNvPicPr>
+            <a:picLocks noChangeAspect="1"/>
+          </p:cNvPicPr>
+          <p:nvPr/>
+        </p:nvPicPr>
+        <p:blipFill>
+          <a:blip r:embed="rId12"/>
+          <a:stretch>
+            <a:fillRect/>
+          </a:stretch>
+        </p:blipFill>
+        <p:spPr>
+          <a:xfrm>
+            <a:off x="4834069" y="5463221"/>
+            <a:ext cx="1553679" cy="1222064"/>
+          </a:xfrm>
+          <a:prstGeom prst="rect">
+            <a:avLst/>
+          </a:prstGeom>
+        </p:spPr>
+      </p:pic>
+      <p:pic>
+        <p:nvPicPr>
+          <p:cNvPr id="18" name="Picture 17">
+            <a:extLst>
+              <a:ext uri="{FF2B5EF4-FFF2-40B4-BE49-F238E27FC236}">
+                <a16:creationId xmlns:a16="http://schemas.microsoft.com/office/drawing/2014/main" id="{9FD60CE3-7F6D-9387-78F1-5D0677C309AB}"/>
+              </a:ext>
+            </a:extLst>
+          </p:cNvPr>
+          <p:cNvPicPr>
+            <a:picLocks noChangeAspect="1"/>
+          </p:cNvPicPr>
+          <p:nvPr/>
+        </p:nvPicPr>
+        <p:blipFill>
+          <a:blip r:embed="rId13"/>
+          <a:stretch>
+            <a:fillRect/>
+          </a:stretch>
+        </p:blipFill>
+        <p:spPr>
+          <a:xfrm>
+            <a:off x="7340773" y="5359037"/>
+            <a:ext cx="1430432" cy="1430432"/>
           </a:xfrm>
           <a:prstGeom prst="rect">
             <a:avLst/>

</xml_diff>